<commit_message>
Revert "Merge pull request #2 from VirPratapUttam/test"
This reverts commit 3bc780fbeb7fff4acd0efffd7a812d0ebe8f8e4a, reversing
changes made to f78e5aff4f75bcf2582136d7c1f40c3532c3da65.
</commit_message>
<xml_diff>
--- a/React.pptx
+++ b/React.pptx
@@ -118,7 +118,7 @@
   </p:defaultTextStyle>
   <p:extLst>
     <p:ext uri="{EFAFB233-063F-42B5-8137-9DF3F51BA10A}">
-      <p15:sldGuideLst xmlns:p15="http://schemas.microsoft.com/office/powerpoint/2012/main" xmlns="">
+      <p15:sldGuideLst xmlns:p15="http://schemas.microsoft.com/office/powerpoint/2012/main">
         <p15:guide id="1" orient="horz" pos="2160">
           <p15:clr>
             <a:srgbClr val="A4A3A4"/>
@@ -140,7 +140,7 @@
   <p:cmAuthor id="1" name="Surendra Singh Kushwaha" initials="SSK" lastIdx="2" clrIdx="0">
     <p:extLst>
       <p:ext uri="{19B8F6BF-5375-455C-9EA6-DF929625EA0E}">
-        <p15:presenceInfo xmlns:p15="http://schemas.microsoft.com/office/powerpoint/2012/main" xmlns="" userId="S-1-5-21-121752565-2208887045-340623127-23477206" providerId="AD"/>
+        <p15:presenceInfo xmlns:p15="http://schemas.microsoft.com/office/powerpoint/2012/main" userId="S-1-5-21-121752565-2208887045-340623127-23477206" providerId="AD"/>
       </p:ext>
     </p:extLst>
   </p:cmAuthor>
@@ -154,7 +154,7 @@
     <p:text>for Space</p:text>
     <p:extLst>
       <p:ext uri="{C676402C-5697-4E1C-873F-D02D1690AC5C}">
-        <p15:threadingInfo xmlns:p15="http://schemas.microsoft.com/office/powerpoint/2012/main" xmlns="" timeZoneBias="-330"/>
+        <p15:threadingInfo xmlns:p15="http://schemas.microsoft.com/office/powerpoint/2012/main" timeZoneBias="-330"/>
       </p:ext>
     </p:extLst>
   </p:cm>
@@ -163,7 +163,7 @@
     <p:text>Text with space</p:text>
     <p:extLst>
       <p:ext uri="{C676402C-5697-4E1C-873F-D02D1690AC5C}">
-        <p15:threadingInfo xmlns:p15="http://schemas.microsoft.com/office/powerpoint/2012/main" xmlns="" timeZoneBias="-330"/>
+        <p15:threadingInfo xmlns:p15="http://schemas.microsoft.com/office/powerpoint/2012/main" timeZoneBias="-330"/>
       </p:ext>
     </p:extLst>
   </p:cm>
@@ -892,8 +892,7 @@
           <a:p>
             <a:fld id="{AAB9BE4A-1841-4579-8F32-8CA6220F4A6C}" type="datetimeFigureOut">
               <a:rPr lang="en-US" smtClean="0"/>
-              <a:pPr/>
-              <a:t>10/21/2018</a:t>
+              <a:t>9/25/2018</a:t>
             </a:fld>
             <a:endParaRPr lang="en-US"/>
           </a:p>
@@ -935,7 +934,6 @@
           <a:p>
             <a:fld id="{B943467A-B515-4002-9131-8555D12AB657}" type="slidenum">
               <a:rPr lang="en-US" smtClean="0"/>
-              <a:pPr/>
               <a:t>‹#›</a:t>
             </a:fld>
             <a:endParaRPr lang="en-US"/>
@@ -945,7 +943,7 @@
     </p:spTree>
     <p:extLst>
       <p:ext uri="{BB962C8B-B14F-4D97-AF65-F5344CB8AC3E}">
-        <p14:creationId xmlns:p14="http://schemas.microsoft.com/office/powerpoint/2010/main" xmlns="" val="594406892"/>
+        <p14:creationId xmlns:p14="http://schemas.microsoft.com/office/powerpoint/2010/main" val="594406892"/>
       </p:ext>
     </p:extLst>
   </p:cSld>
@@ -1145,8 +1143,7 @@
           <a:p>
             <a:fld id="{AAB9BE4A-1841-4579-8F32-8CA6220F4A6C}" type="datetimeFigureOut">
               <a:rPr lang="en-US" smtClean="0"/>
-              <a:pPr/>
-              <a:t>10/21/2018</a:t>
+              <a:t>9/25/2018</a:t>
             </a:fld>
             <a:endParaRPr lang="en-US"/>
           </a:p>
@@ -1188,7 +1185,6 @@
           <a:p>
             <a:fld id="{B943467A-B515-4002-9131-8555D12AB657}" type="slidenum">
               <a:rPr lang="en-US" smtClean="0"/>
-              <a:pPr/>
               <a:t>‹#›</a:t>
             </a:fld>
             <a:endParaRPr lang="en-US"/>
@@ -1198,7 +1194,7 @@
     </p:spTree>
     <p:extLst>
       <p:ext uri="{BB962C8B-B14F-4D97-AF65-F5344CB8AC3E}">
-        <p14:creationId xmlns:p14="http://schemas.microsoft.com/office/powerpoint/2010/main" xmlns="" val="3831263113"/>
+        <p14:creationId xmlns:p14="http://schemas.microsoft.com/office/powerpoint/2010/main" val="3831263113"/>
       </p:ext>
     </p:extLst>
   </p:cSld>
@@ -1461,8 +1457,7 @@
           <a:p>
             <a:fld id="{AAB9BE4A-1841-4579-8F32-8CA6220F4A6C}" type="datetimeFigureOut">
               <a:rPr lang="en-US" smtClean="0"/>
-              <a:pPr/>
-              <a:t>10/21/2018</a:t>
+              <a:t>9/25/2018</a:t>
             </a:fld>
             <a:endParaRPr lang="en-US"/>
           </a:p>
@@ -1504,7 +1499,6 @@
           <a:p>
             <a:fld id="{B943467A-B515-4002-9131-8555D12AB657}" type="slidenum">
               <a:rPr lang="en-US" smtClean="0"/>
-              <a:pPr/>
               <a:t>‹#›</a:t>
             </a:fld>
             <a:endParaRPr lang="en-US"/>
@@ -1604,7 +1598,7 @@
     </p:spTree>
     <p:extLst>
       <p:ext uri="{BB962C8B-B14F-4D97-AF65-F5344CB8AC3E}">
-        <p14:creationId xmlns:p14="http://schemas.microsoft.com/office/powerpoint/2010/main" xmlns="" val="2408878689"/>
+        <p14:creationId xmlns:p14="http://schemas.microsoft.com/office/powerpoint/2010/main" val="2408878689"/>
       </p:ext>
     </p:extLst>
   </p:cSld>
@@ -1804,8 +1798,7 @@
           <a:p>
             <a:fld id="{AAB9BE4A-1841-4579-8F32-8CA6220F4A6C}" type="datetimeFigureOut">
               <a:rPr lang="en-US" smtClean="0"/>
-              <a:pPr/>
-              <a:t>10/21/2018</a:t>
+              <a:t>9/25/2018</a:t>
             </a:fld>
             <a:endParaRPr lang="en-US"/>
           </a:p>
@@ -1847,7 +1840,6 @@
           <a:p>
             <a:fld id="{B943467A-B515-4002-9131-8555D12AB657}" type="slidenum">
               <a:rPr lang="en-US" smtClean="0"/>
-              <a:pPr/>
               <a:t>‹#›</a:t>
             </a:fld>
             <a:endParaRPr lang="en-US"/>
@@ -1857,7 +1849,7 @@
     </p:spTree>
     <p:extLst>
       <p:ext uri="{BB962C8B-B14F-4D97-AF65-F5344CB8AC3E}">
-        <p14:creationId xmlns:p14="http://schemas.microsoft.com/office/powerpoint/2010/main" xmlns="" val="2957667504"/>
+        <p14:creationId xmlns:p14="http://schemas.microsoft.com/office/powerpoint/2010/main" val="2957667504"/>
       </p:ext>
     </p:extLst>
   </p:cSld>
@@ -2120,8 +2112,7 @@
           <a:p>
             <a:fld id="{AAB9BE4A-1841-4579-8F32-8CA6220F4A6C}" type="datetimeFigureOut">
               <a:rPr lang="en-US" smtClean="0"/>
-              <a:pPr/>
-              <a:t>10/21/2018</a:t>
+              <a:t>9/25/2018</a:t>
             </a:fld>
             <a:endParaRPr lang="en-US"/>
           </a:p>
@@ -2163,7 +2154,6 @@
           <a:p>
             <a:fld id="{B943467A-B515-4002-9131-8555D12AB657}" type="slidenum">
               <a:rPr lang="en-US" smtClean="0"/>
-              <a:pPr/>
               <a:t>‹#›</a:t>
             </a:fld>
             <a:endParaRPr lang="en-US"/>
@@ -2255,7 +2245,7 @@
     </p:spTree>
     <p:extLst>
       <p:ext uri="{BB962C8B-B14F-4D97-AF65-F5344CB8AC3E}">
-        <p14:creationId xmlns:p14="http://schemas.microsoft.com/office/powerpoint/2010/main" xmlns="" val="3494224057"/>
+        <p14:creationId xmlns:p14="http://schemas.microsoft.com/office/powerpoint/2010/main" val="3494224057"/>
       </p:ext>
     </p:extLst>
   </p:cSld>
@@ -2515,8 +2505,7 @@
           <a:p>
             <a:fld id="{AAB9BE4A-1841-4579-8F32-8CA6220F4A6C}" type="datetimeFigureOut">
               <a:rPr lang="en-US" smtClean="0"/>
-              <a:pPr/>
-              <a:t>10/21/2018</a:t>
+              <a:t>9/25/2018</a:t>
             </a:fld>
             <a:endParaRPr lang="en-US"/>
           </a:p>
@@ -2558,7 +2547,6 @@
           <a:p>
             <a:fld id="{B943467A-B515-4002-9131-8555D12AB657}" type="slidenum">
               <a:rPr lang="en-US" smtClean="0"/>
-              <a:pPr/>
               <a:t>‹#›</a:t>
             </a:fld>
             <a:endParaRPr lang="en-US"/>
@@ -2568,7 +2556,7 @@
     </p:spTree>
     <p:extLst>
       <p:ext uri="{BB962C8B-B14F-4D97-AF65-F5344CB8AC3E}">
-        <p14:creationId xmlns:p14="http://schemas.microsoft.com/office/powerpoint/2010/main" xmlns="" val="1027716365"/>
+        <p14:creationId xmlns:p14="http://schemas.microsoft.com/office/powerpoint/2010/main" val="1027716365"/>
       </p:ext>
     </p:extLst>
   </p:cSld>
@@ -2687,8 +2675,7 @@
           <a:p>
             <a:fld id="{AAB9BE4A-1841-4579-8F32-8CA6220F4A6C}" type="datetimeFigureOut">
               <a:rPr lang="en-US" smtClean="0"/>
-              <a:pPr/>
-              <a:t>10/21/2018</a:t>
+              <a:t>9/25/2018</a:t>
             </a:fld>
             <a:endParaRPr lang="en-US"/>
           </a:p>
@@ -2730,7 +2717,6 @@
           <a:p>
             <a:fld id="{B943467A-B515-4002-9131-8555D12AB657}" type="slidenum">
               <a:rPr lang="en-US" smtClean="0"/>
-              <a:pPr/>
               <a:t>‹#›</a:t>
             </a:fld>
             <a:endParaRPr lang="en-US"/>
@@ -2740,7 +2726,7 @@
     </p:spTree>
     <p:extLst>
       <p:ext uri="{BB962C8B-B14F-4D97-AF65-F5344CB8AC3E}">
-        <p14:creationId xmlns:p14="http://schemas.microsoft.com/office/powerpoint/2010/main" xmlns="" val="2079291997"/>
+        <p14:creationId xmlns:p14="http://schemas.microsoft.com/office/powerpoint/2010/main" val="2079291997"/>
       </p:ext>
     </p:extLst>
   </p:cSld>
@@ -2869,8 +2855,7 @@
           <a:p>
             <a:fld id="{AAB9BE4A-1841-4579-8F32-8CA6220F4A6C}" type="datetimeFigureOut">
               <a:rPr lang="en-US" smtClean="0"/>
-              <a:pPr/>
-              <a:t>10/21/2018</a:t>
+              <a:t>9/25/2018</a:t>
             </a:fld>
             <a:endParaRPr lang="en-US"/>
           </a:p>
@@ -2912,7 +2897,6 @@
           <a:p>
             <a:fld id="{B943467A-B515-4002-9131-8555D12AB657}" type="slidenum">
               <a:rPr lang="en-US" smtClean="0"/>
-              <a:pPr/>
               <a:t>‹#›</a:t>
             </a:fld>
             <a:endParaRPr lang="en-US"/>
@@ -2922,7 +2906,7 @@
     </p:spTree>
     <p:extLst>
       <p:ext uri="{BB962C8B-B14F-4D97-AF65-F5344CB8AC3E}">
-        <p14:creationId xmlns:p14="http://schemas.microsoft.com/office/powerpoint/2010/main" xmlns="" val="2983839585"/>
+        <p14:creationId xmlns:p14="http://schemas.microsoft.com/office/powerpoint/2010/main" val="2983839585"/>
       </p:ext>
     </p:extLst>
   </p:cSld>
@@ -3047,8 +3031,7 @@
           <a:p>
             <a:fld id="{AAB9BE4A-1841-4579-8F32-8CA6220F4A6C}" type="datetimeFigureOut">
               <a:rPr lang="en-US" smtClean="0"/>
-              <a:pPr/>
-              <a:t>10/21/2018</a:t>
+              <a:t>9/25/2018</a:t>
             </a:fld>
             <a:endParaRPr lang="en-US"/>
           </a:p>
@@ -3090,7 +3073,6 @@
           <a:p>
             <a:fld id="{B943467A-B515-4002-9131-8555D12AB657}" type="slidenum">
               <a:rPr lang="en-US" smtClean="0"/>
-              <a:pPr/>
               <a:t>‹#›</a:t>
             </a:fld>
             <a:endParaRPr lang="en-US"/>
@@ -3100,7 +3082,7 @@
     </p:spTree>
     <p:extLst>
       <p:ext uri="{BB962C8B-B14F-4D97-AF65-F5344CB8AC3E}">
-        <p14:creationId xmlns:p14="http://schemas.microsoft.com/office/powerpoint/2010/main" xmlns="" val="2281043889"/>
+        <p14:creationId xmlns:p14="http://schemas.microsoft.com/office/powerpoint/2010/main" val="2281043889"/>
       </p:ext>
     </p:extLst>
   </p:cSld>
@@ -3296,8 +3278,7 @@
           <a:p>
             <a:fld id="{AAB9BE4A-1841-4579-8F32-8CA6220F4A6C}" type="datetimeFigureOut">
               <a:rPr lang="en-US" smtClean="0"/>
-              <a:pPr/>
-              <a:t>10/21/2018</a:t>
+              <a:t>9/25/2018</a:t>
             </a:fld>
             <a:endParaRPr lang="en-US"/>
           </a:p>
@@ -3339,7 +3320,6 @@
           <a:p>
             <a:fld id="{B943467A-B515-4002-9131-8555D12AB657}" type="slidenum">
               <a:rPr lang="en-US" smtClean="0"/>
-              <a:pPr/>
               <a:t>‹#›</a:t>
             </a:fld>
             <a:endParaRPr lang="en-US"/>
@@ -3349,7 +3329,7 @@
     </p:spTree>
     <p:extLst>
       <p:ext uri="{BB962C8B-B14F-4D97-AF65-F5344CB8AC3E}">
-        <p14:creationId xmlns:p14="http://schemas.microsoft.com/office/powerpoint/2010/main" xmlns="" val="2635470790"/>
+        <p14:creationId xmlns:p14="http://schemas.microsoft.com/office/powerpoint/2010/main" val="2635470790"/>
       </p:ext>
     </p:extLst>
   </p:cSld>
@@ -3530,8 +3510,7 @@
           <a:p>
             <a:fld id="{AAB9BE4A-1841-4579-8F32-8CA6220F4A6C}" type="datetimeFigureOut">
               <a:rPr lang="en-US" smtClean="0"/>
-              <a:pPr/>
-              <a:t>10/21/2018</a:t>
+              <a:t>9/25/2018</a:t>
             </a:fld>
             <a:endParaRPr lang="en-US"/>
           </a:p>
@@ -3573,7 +3552,6 @@
           <a:p>
             <a:fld id="{B943467A-B515-4002-9131-8555D12AB657}" type="slidenum">
               <a:rPr lang="en-US" smtClean="0"/>
-              <a:pPr/>
               <a:t>‹#›</a:t>
             </a:fld>
             <a:endParaRPr lang="en-US"/>
@@ -3583,7 +3561,7 @@
     </p:spTree>
     <p:extLst>
       <p:ext uri="{BB962C8B-B14F-4D97-AF65-F5344CB8AC3E}">
-        <p14:creationId xmlns:p14="http://schemas.microsoft.com/office/powerpoint/2010/main" xmlns="" val="993531880"/>
+        <p14:creationId xmlns:p14="http://schemas.microsoft.com/office/powerpoint/2010/main" val="993531880"/>
       </p:ext>
     </p:extLst>
   </p:cSld>
@@ -3906,8 +3884,7 @@
           <a:p>
             <a:fld id="{AAB9BE4A-1841-4579-8F32-8CA6220F4A6C}" type="datetimeFigureOut">
               <a:rPr lang="en-US" smtClean="0"/>
-              <a:pPr/>
-              <a:t>10/21/2018</a:t>
+              <a:t>9/25/2018</a:t>
             </a:fld>
             <a:endParaRPr lang="en-US"/>
           </a:p>
@@ -3949,7 +3926,6 @@
           <a:p>
             <a:fld id="{B943467A-B515-4002-9131-8555D12AB657}" type="slidenum">
               <a:rPr lang="en-US" smtClean="0"/>
-              <a:pPr/>
               <a:t>‹#›</a:t>
             </a:fld>
             <a:endParaRPr lang="en-US"/>
@@ -3959,7 +3935,7 @@
     </p:spTree>
     <p:extLst>
       <p:ext uri="{BB962C8B-B14F-4D97-AF65-F5344CB8AC3E}">
-        <p14:creationId xmlns:p14="http://schemas.microsoft.com/office/powerpoint/2010/main" xmlns="" val="3626376204"/>
+        <p14:creationId xmlns:p14="http://schemas.microsoft.com/office/powerpoint/2010/main" val="3626376204"/>
       </p:ext>
     </p:extLst>
   </p:cSld>
@@ -4031,8 +4007,7 @@
           <a:p>
             <a:fld id="{AAB9BE4A-1841-4579-8F32-8CA6220F4A6C}" type="datetimeFigureOut">
               <a:rPr lang="en-US" smtClean="0"/>
-              <a:pPr/>
-              <a:t>10/21/2018</a:t>
+              <a:t>9/25/2018</a:t>
             </a:fld>
             <a:endParaRPr lang="en-US"/>
           </a:p>
@@ -4074,7 +4049,6 @@
           <a:p>
             <a:fld id="{B943467A-B515-4002-9131-8555D12AB657}" type="slidenum">
               <a:rPr lang="en-US" smtClean="0"/>
-              <a:pPr/>
               <a:t>‹#›</a:t>
             </a:fld>
             <a:endParaRPr lang="en-US"/>
@@ -4084,7 +4058,7 @@
     </p:spTree>
     <p:extLst>
       <p:ext uri="{BB962C8B-B14F-4D97-AF65-F5344CB8AC3E}">
-        <p14:creationId xmlns:p14="http://schemas.microsoft.com/office/powerpoint/2010/main" xmlns="" val="2722882345"/>
+        <p14:creationId xmlns:p14="http://schemas.microsoft.com/office/powerpoint/2010/main" val="2722882345"/>
       </p:ext>
     </p:extLst>
   </p:cSld>
@@ -4128,8 +4102,7 @@
           <a:p>
             <a:fld id="{AAB9BE4A-1841-4579-8F32-8CA6220F4A6C}" type="datetimeFigureOut">
               <a:rPr lang="en-US" smtClean="0"/>
-              <a:pPr/>
-              <a:t>10/21/2018</a:t>
+              <a:t>9/25/2018</a:t>
             </a:fld>
             <a:endParaRPr lang="en-US"/>
           </a:p>
@@ -4171,7 +4144,6 @@
           <a:p>
             <a:fld id="{B943467A-B515-4002-9131-8555D12AB657}" type="slidenum">
               <a:rPr lang="en-US" smtClean="0"/>
-              <a:pPr/>
               <a:t>‹#›</a:t>
             </a:fld>
             <a:endParaRPr lang="en-US"/>
@@ -4181,7 +4153,7 @@
     </p:spTree>
     <p:extLst>
       <p:ext uri="{BB962C8B-B14F-4D97-AF65-F5344CB8AC3E}">
-        <p14:creationId xmlns:p14="http://schemas.microsoft.com/office/powerpoint/2010/main" xmlns="" val="2198059778"/>
+        <p14:creationId xmlns:p14="http://schemas.microsoft.com/office/powerpoint/2010/main" val="2198059778"/>
       </p:ext>
     </p:extLst>
   </p:cSld>
@@ -4385,8 +4357,7 @@
           <a:p>
             <a:fld id="{AAB9BE4A-1841-4579-8F32-8CA6220F4A6C}" type="datetimeFigureOut">
               <a:rPr lang="en-US" smtClean="0"/>
-              <a:pPr/>
-              <a:t>10/21/2018</a:t>
+              <a:t>9/25/2018</a:t>
             </a:fld>
             <a:endParaRPr lang="en-US"/>
           </a:p>
@@ -4428,7 +4399,6 @@
           <a:p>
             <a:fld id="{B943467A-B515-4002-9131-8555D12AB657}" type="slidenum">
               <a:rPr lang="en-US" smtClean="0"/>
-              <a:pPr/>
               <a:t>‹#›</a:t>
             </a:fld>
             <a:endParaRPr lang="en-US"/>
@@ -4438,7 +4408,7 @@
     </p:spTree>
     <p:extLst>
       <p:ext uri="{BB962C8B-B14F-4D97-AF65-F5344CB8AC3E}">
-        <p14:creationId xmlns:p14="http://schemas.microsoft.com/office/powerpoint/2010/main" xmlns="" val="2642439309"/>
+        <p14:creationId xmlns:p14="http://schemas.microsoft.com/office/powerpoint/2010/main" val="2642439309"/>
       </p:ext>
     </p:extLst>
   </p:cSld>
@@ -4650,8 +4620,7 @@
           <a:p>
             <a:fld id="{AAB9BE4A-1841-4579-8F32-8CA6220F4A6C}" type="datetimeFigureOut">
               <a:rPr lang="en-US" smtClean="0"/>
-              <a:pPr/>
-              <a:t>10/21/2018</a:t>
+              <a:t>9/25/2018</a:t>
             </a:fld>
             <a:endParaRPr lang="en-US"/>
           </a:p>
@@ -4693,7 +4662,6 @@
           <a:p>
             <a:fld id="{B943467A-B515-4002-9131-8555D12AB657}" type="slidenum">
               <a:rPr lang="en-US" smtClean="0"/>
-              <a:pPr/>
               <a:t>‹#›</a:t>
             </a:fld>
             <a:endParaRPr lang="en-US"/>
@@ -4703,7 +4671,7 @@
     </p:spTree>
     <p:extLst>
       <p:ext uri="{BB962C8B-B14F-4D97-AF65-F5344CB8AC3E}">
-        <p14:creationId xmlns:p14="http://schemas.microsoft.com/office/powerpoint/2010/main" xmlns="" val="3795284327"/>
+        <p14:creationId xmlns:p14="http://schemas.microsoft.com/office/powerpoint/2010/main" val="3795284327"/>
       </p:ext>
     </p:extLst>
   </p:cSld>
@@ -5395,8 +5363,7 @@
           <a:p>
             <a:fld id="{AAB9BE4A-1841-4579-8F32-8CA6220F4A6C}" type="datetimeFigureOut">
               <a:rPr lang="en-US" smtClean="0"/>
-              <a:pPr/>
-              <a:t>10/21/2018</a:t>
+              <a:t>9/25/2018</a:t>
             </a:fld>
             <a:endParaRPr lang="en-US"/>
           </a:p>
@@ -5472,7 +5439,6 @@
           <a:p>
             <a:fld id="{B943467A-B515-4002-9131-8555D12AB657}" type="slidenum">
               <a:rPr lang="en-US" smtClean="0"/>
-              <a:pPr/>
               <a:t>‹#›</a:t>
             </a:fld>
             <a:endParaRPr lang="en-US"/>
@@ -5482,7 +5448,7 @@
     </p:spTree>
     <p:extLst>
       <p:ext uri="{BB962C8B-B14F-4D97-AF65-F5344CB8AC3E}">
-        <p14:creationId xmlns:p14="http://schemas.microsoft.com/office/powerpoint/2010/main" xmlns="" val="3775027711"/>
+        <p14:creationId xmlns:p14="http://schemas.microsoft.com/office/powerpoint/2010/main" val="3775027711"/>
       </p:ext>
     </p:extLst>
   </p:cSld>
@@ -6060,14 +6026,13 @@
               <a:buAutoNum type="arabicPeriod"/>
             </a:pPr>
             <a:r>
-              <a:rPr lang="en-US" sz="1600" b="1"/>
+              <a:rPr lang="en-US" sz="1600" b="1" dirty="0"/>
               <a:t>React </a:t>
             </a:r>
             <a:r>
-              <a:rPr lang="en-US" sz="1600" b="1" smtClean="0"/>
-              <a:t>Library  </a:t>
-            </a:r>
-            <a:endParaRPr lang="en-US" sz="1600" b="1" dirty="0" smtClean="0"/>
+              <a:rPr lang="en-US" sz="1600" b="1" dirty="0" smtClean="0"/>
+              <a:t>Library</a:t>
+            </a:r>
           </a:p>
           <a:p>
             <a:pPr marL="342900" indent="-342900" algn="l">
@@ -6156,7 +6121,7 @@
     </p:spTree>
     <p:extLst>
       <p:ext uri="{BB962C8B-B14F-4D97-AF65-F5344CB8AC3E}">
-        <p14:creationId xmlns:p14="http://schemas.microsoft.com/office/powerpoint/2010/main" xmlns="" val="2158088091"/>
+        <p14:creationId xmlns:p14="http://schemas.microsoft.com/office/powerpoint/2010/main" val="2158088091"/>
       </p:ext>
     </p:extLst>
   </p:cSld>
@@ -6243,14 +6208,14 @@
           <a:effectLst/>
           <a:extLst>
             <a:ext uri="{909E8E84-426E-40DD-AFC4-6F175D3DCCD1}">
-              <a14:hiddenFill xmlns:a14="http://schemas.microsoft.com/office/drawing/2010/main" xmlns="">
+              <a14:hiddenFill xmlns:a14="http://schemas.microsoft.com/office/drawing/2010/main">
                 <a:solidFill>
                   <a:schemeClr val="accent1"/>
                 </a:solidFill>
               </a14:hiddenFill>
             </a:ext>
             <a:ext uri="{91240B29-F687-4F45-9708-019B960494DF}">
-              <a14:hiddenLine xmlns:a14="http://schemas.microsoft.com/office/drawing/2010/main" xmlns="" w="9525">
+              <a14:hiddenLine xmlns:a14="http://schemas.microsoft.com/office/drawing/2010/main" w="9525">
                 <a:solidFill>
                   <a:schemeClr val="tx1"/>
                 </a:solidFill>
@@ -6260,7 +6225,7 @@
               </a14:hiddenLine>
             </a:ext>
             <a:ext uri="{AF507438-7753-43E0-B8FC-AC1667EBCBE1}">
-              <a14:hiddenEffects xmlns:a14="http://schemas.microsoft.com/office/drawing/2010/main" xmlns="">
+              <a14:hiddenEffects xmlns:a14="http://schemas.microsoft.com/office/drawing/2010/main">
                 <a:effectLst>
                   <a:outerShdw dist="35921" dir="2700000" algn="ctr" rotWithShape="0">
                     <a:schemeClr val="bg2"/>
@@ -6608,7 +6573,7 @@
     </p:spTree>
     <p:extLst>
       <p:ext uri="{BB962C8B-B14F-4D97-AF65-F5344CB8AC3E}">
-        <p14:creationId xmlns:p14="http://schemas.microsoft.com/office/powerpoint/2010/main" xmlns="" val="3309165450"/>
+        <p14:creationId xmlns:p14="http://schemas.microsoft.com/office/powerpoint/2010/main" val="3309165450"/>
       </p:ext>
     </p:extLst>
   </p:cSld>
@@ -6681,7 +6646,7 @@
           <p:nvPr>
             <p:extLst>
               <p:ext uri="{D42A27DB-BD31-4B8C-83A1-F6EECF244321}">
-                <p14:modId xmlns:p14="http://schemas.microsoft.com/office/powerpoint/2010/main" xmlns="" val="1477070037"/>
+                <p14:modId xmlns:p14="http://schemas.microsoft.com/office/powerpoint/2010/main" val="1477070037"/>
               </p:ext>
             </p:extLst>
           </p:nvPr>
@@ -6700,14 +6665,14 @@
                 <a:gridCol w="4256447">
                   <a:extLst>
                     <a:ext uri="{9D8B030D-6E8A-4147-A177-3AD203B41FA5}">
-                      <a16:colId xmlns:a16="http://schemas.microsoft.com/office/drawing/2014/main" xmlns="" val="76878962"/>
+                      <a16:colId xmlns:a16="http://schemas.microsoft.com/office/drawing/2014/main" val="76878962"/>
                     </a:ext>
                   </a:extLst>
                 </a:gridCol>
                 <a:gridCol w="5968001">
                   <a:extLst>
                     <a:ext uri="{9D8B030D-6E8A-4147-A177-3AD203B41FA5}">
-                      <a16:colId xmlns:a16="http://schemas.microsoft.com/office/drawing/2014/main" xmlns="" val="280503563"/>
+                      <a16:colId xmlns:a16="http://schemas.microsoft.com/office/drawing/2014/main" val="280503563"/>
                     </a:ext>
                   </a:extLst>
                 </a:gridCol>
@@ -6743,7 +6708,7 @@
                 </a:tc>
                 <a:extLst>
                   <a:ext uri="{0D108BD9-81ED-4DB2-BD59-A6C34878D82A}">
-                    <a16:rowId xmlns:a16="http://schemas.microsoft.com/office/drawing/2014/main" xmlns="" val="1779551973"/>
+                    <a16:rowId xmlns:a16="http://schemas.microsoft.com/office/drawing/2014/main" val="1779551973"/>
                   </a:ext>
                 </a:extLst>
               </a:tr>
@@ -7820,7 +7785,7 @@
                 </a:tc>
                 <a:extLst>
                   <a:ext uri="{0D108BD9-81ED-4DB2-BD59-A6C34878D82A}">
-                    <a16:rowId xmlns:a16="http://schemas.microsoft.com/office/drawing/2014/main" xmlns="" val="3553546565"/>
+                    <a16:rowId xmlns:a16="http://schemas.microsoft.com/office/drawing/2014/main" val="3553546565"/>
                   </a:ext>
                 </a:extLst>
               </a:tr>
@@ -7959,7 +7924,7 @@
     </p:spTree>
     <p:extLst>
       <p:ext uri="{BB962C8B-B14F-4D97-AF65-F5344CB8AC3E}">
-        <p14:creationId xmlns:p14="http://schemas.microsoft.com/office/powerpoint/2010/main" xmlns="" val="2747435412"/>
+        <p14:creationId xmlns:p14="http://schemas.microsoft.com/office/powerpoint/2010/main" val="2747435412"/>
       </p:ext>
     </p:extLst>
   </p:cSld>
@@ -8032,7 +7997,7 @@
           <p:nvPr>
             <p:extLst>
               <p:ext uri="{D42A27DB-BD31-4B8C-83A1-F6EECF244321}">
-                <p14:modId xmlns:p14="http://schemas.microsoft.com/office/powerpoint/2010/main" xmlns="" val="122378422"/>
+                <p14:modId xmlns:p14="http://schemas.microsoft.com/office/powerpoint/2010/main" val="122378422"/>
               </p:ext>
             </p:extLst>
           </p:nvPr>
@@ -8051,14 +8016,14 @@
                 <a:gridCol w="4256447">
                   <a:extLst>
                     <a:ext uri="{9D8B030D-6E8A-4147-A177-3AD203B41FA5}">
-                      <a16:colId xmlns:a16="http://schemas.microsoft.com/office/drawing/2014/main" xmlns="" val="76878962"/>
+                      <a16:colId xmlns:a16="http://schemas.microsoft.com/office/drawing/2014/main" val="76878962"/>
                     </a:ext>
                   </a:extLst>
                 </a:gridCol>
                 <a:gridCol w="5968001">
                   <a:extLst>
                     <a:ext uri="{9D8B030D-6E8A-4147-A177-3AD203B41FA5}">
-                      <a16:colId xmlns:a16="http://schemas.microsoft.com/office/drawing/2014/main" xmlns="" val="280503563"/>
+                      <a16:colId xmlns:a16="http://schemas.microsoft.com/office/drawing/2014/main" val="280503563"/>
                     </a:ext>
                   </a:extLst>
                 </a:gridCol>
@@ -8094,7 +8059,7 @@
                 </a:tc>
                 <a:extLst>
                   <a:ext uri="{0D108BD9-81ED-4DB2-BD59-A6C34878D82A}">
-                    <a16:rowId xmlns:a16="http://schemas.microsoft.com/office/drawing/2014/main" xmlns="" val="1779551973"/>
+                    <a16:rowId xmlns:a16="http://schemas.microsoft.com/office/drawing/2014/main" val="1779551973"/>
                   </a:ext>
                 </a:extLst>
               </a:tr>
@@ -9416,7 +9381,7 @@
                 </a:tc>
                 <a:extLst>
                   <a:ext uri="{0D108BD9-81ED-4DB2-BD59-A6C34878D82A}">
-                    <a16:rowId xmlns:a16="http://schemas.microsoft.com/office/drawing/2014/main" xmlns="" val="3553546565"/>
+                    <a16:rowId xmlns:a16="http://schemas.microsoft.com/office/drawing/2014/main" val="3553546565"/>
                   </a:ext>
                 </a:extLst>
               </a:tr>
@@ -9541,7 +9506,7 @@
     </p:spTree>
     <p:extLst>
       <p:ext uri="{BB962C8B-B14F-4D97-AF65-F5344CB8AC3E}">
-        <p14:creationId xmlns:p14="http://schemas.microsoft.com/office/powerpoint/2010/main" xmlns="" val="2195820897"/>
+        <p14:creationId xmlns:p14="http://schemas.microsoft.com/office/powerpoint/2010/main" val="2195820897"/>
       </p:ext>
     </p:extLst>
   </p:cSld>
@@ -9632,7 +9597,7 @@
     </p:spTree>
     <p:extLst>
       <p:ext uri="{BB962C8B-B14F-4D97-AF65-F5344CB8AC3E}">
-        <p14:creationId xmlns:p14="http://schemas.microsoft.com/office/powerpoint/2010/main" xmlns="" val="448714086"/>
+        <p14:creationId xmlns:p14="http://schemas.microsoft.com/office/powerpoint/2010/main" val="448714086"/>
       </p:ext>
     </p:extLst>
   </p:cSld>
@@ -9782,7 +9747,7 @@
           <p:nvPr>
             <p:extLst>
               <p:ext uri="{D42A27DB-BD31-4B8C-83A1-F6EECF244321}">
-                <p14:modId xmlns:p14="http://schemas.microsoft.com/office/powerpoint/2010/main" xmlns="" val="736284383"/>
+                <p14:modId xmlns:p14="http://schemas.microsoft.com/office/powerpoint/2010/main" val="736284383"/>
               </p:ext>
             </p:extLst>
           </p:nvPr>
@@ -9801,14 +9766,14 @@
                 <a:gridCol w="5876529">
                   <a:extLst>
                     <a:ext uri="{9D8B030D-6E8A-4147-A177-3AD203B41FA5}">
-                      <a16:colId xmlns:a16="http://schemas.microsoft.com/office/drawing/2014/main" xmlns="" val="1108588430"/>
+                      <a16:colId xmlns:a16="http://schemas.microsoft.com/office/drawing/2014/main" val="1108588430"/>
                     </a:ext>
                   </a:extLst>
                 </a:gridCol>
                 <a:gridCol w="6052234">
                   <a:extLst>
                     <a:ext uri="{9D8B030D-6E8A-4147-A177-3AD203B41FA5}">
-                      <a16:colId xmlns:a16="http://schemas.microsoft.com/office/drawing/2014/main" xmlns="" val="245801126"/>
+                      <a16:colId xmlns:a16="http://schemas.microsoft.com/office/drawing/2014/main" val="245801126"/>
                     </a:ext>
                   </a:extLst>
                 </a:gridCol>
@@ -9876,7 +9841,7 @@
                 </a:tc>
                 <a:extLst>
                   <a:ext uri="{0D108BD9-81ED-4DB2-BD59-A6C34878D82A}">
-                    <a16:rowId xmlns:a16="http://schemas.microsoft.com/office/drawing/2014/main" xmlns="" val="402245582"/>
+                    <a16:rowId xmlns:a16="http://schemas.microsoft.com/office/drawing/2014/main" val="402245582"/>
                   </a:ext>
                 </a:extLst>
               </a:tr>
@@ -11112,7 +11077,7 @@
                 </a:tc>
                 <a:extLst>
                   <a:ext uri="{0D108BD9-81ED-4DB2-BD59-A6C34878D82A}">
-                    <a16:rowId xmlns:a16="http://schemas.microsoft.com/office/drawing/2014/main" xmlns="" val="964525336"/>
+                    <a16:rowId xmlns:a16="http://schemas.microsoft.com/office/drawing/2014/main" val="964525336"/>
                   </a:ext>
                 </a:extLst>
               </a:tr>
@@ -11143,14 +11108,14 @@
           <a:effectLst/>
           <a:extLst>
             <a:ext uri="{909E8E84-426E-40DD-AFC4-6F175D3DCCD1}">
-              <a14:hiddenFill xmlns:a14="http://schemas.microsoft.com/office/drawing/2010/main" xmlns="">
+              <a14:hiddenFill xmlns:a14="http://schemas.microsoft.com/office/drawing/2010/main">
                 <a:solidFill>
                   <a:schemeClr val="accent1"/>
                 </a:solidFill>
               </a14:hiddenFill>
             </a:ext>
             <a:ext uri="{91240B29-F687-4F45-9708-019B960494DF}">
-              <a14:hiddenLine xmlns:a14="http://schemas.microsoft.com/office/drawing/2010/main" xmlns="" w="9525">
+              <a14:hiddenLine xmlns:a14="http://schemas.microsoft.com/office/drawing/2010/main" w="9525">
                 <a:solidFill>
                   <a:schemeClr val="tx1"/>
                 </a:solidFill>
@@ -11160,7 +11125,7 @@
               </a14:hiddenLine>
             </a:ext>
             <a:ext uri="{AF507438-7753-43E0-B8FC-AC1667EBCBE1}">
-              <a14:hiddenEffects xmlns:a14="http://schemas.microsoft.com/office/drawing/2010/main" xmlns="">
+              <a14:hiddenEffects xmlns:a14="http://schemas.microsoft.com/office/drawing/2010/main">
                 <a:effectLst>
                   <a:outerShdw dist="35921" dir="2700000" algn="ctr" rotWithShape="0">
                     <a:schemeClr val="bg2"/>
@@ -11591,7 +11556,7 @@
     </p:spTree>
     <p:extLst>
       <p:ext uri="{BB962C8B-B14F-4D97-AF65-F5344CB8AC3E}">
-        <p14:creationId xmlns:p14="http://schemas.microsoft.com/office/powerpoint/2010/main" xmlns="" val="2968145467"/>
+        <p14:creationId xmlns:p14="http://schemas.microsoft.com/office/powerpoint/2010/main" val="2968145467"/>
       </p:ext>
     </p:extLst>
   </p:cSld>
@@ -11792,7 +11757,7 @@
     </p:spTree>
     <p:extLst>
       <p:ext uri="{BB962C8B-B14F-4D97-AF65-F5344CB8AC3E}">
-        <p14:creationId xmlns:p14="http://schemas.microsoft.com/office/powerpoint/2010/main" xmlns="" val="4045823119"/>
+        <p14:creationId xmlns:p14="http://schemas.microsoft.com/office/powerpoint/2010/main" val="4045823119"/>
       </p:ext>
     </p:extLst>
   </p:cSld>
@@ -11879,14 +11844,14 @@
           <a:effectLst/>
           <a:extLst>
             <a:ext uri="{909E8E84-426E-40DD-AFC4-6F175D3DCCD1}">
-              <a14:hiddenFill xmlns:a14="http://schemas.microsoft.com/office/drawing/2010/main" xmlns="">
+              <a14:hiddenFill xmlns:a14="http://schemas.microsoft.com/office/drawing/2010/main">
                 <a:solidFill>
                   <a:schemeClr val="accent1"/>
                 </a:solidFill>
               </a14:hiddenFill>
             </a:ext>
             <a:ext uri="{91240B29-F687-4F45-9708-019B960494DF}">
-              <a14:hiddenLine xmlns:a14="http://schemas.microsoft.com/office/drawing/2010/main" xmlns="" w="9525">
+              <a14:hiddenLine xmlns:a14="http://schemas.microsoft.com/office/drawing/2010/main" w="9525">
                 <a:solidFill>
                   <a:schemeClr val="tx1"/>
                 </a:solidFill>
@@ -11896,7 +11861,7 @@
               </a14:hiddenLine>
             </a:ext>
             <a:ext uri="{AF507438-7753-43E0-B8FC-AC1667EBCBE1}">
-              <a14:hiddenEffects xmlns:a14="http://schemas.microsoft.com/office/drawing/2010/main" xmlns="">
+              <a14:hiddenEffects xmlns:a14="http://schemas.microsoft.com/office/drawing/2010/main">
                 <a:effectLst>
                   <a:outerShdw dist="35921" dir="2700000" algn="ctr" rotWithShape="0">
                     <a:schemeClr val="bg2"/>
@@ -13653,7 +13618,7 @@
     </p:spTree>
     <p:extLst>
       <p:ext uri="{BB962C8B-B14F-4D97-AF65-F5344CB8AC3E}">
-        <p14:creationId xmlns:p14="http://schemas.microsoft.com/office/powerpoint/2010/main" xmlns="" val="3570833559"/>
+        <p14:creationId xmlns:p14="http://schemas.microsoft.com/office/powerpoint/2010/main" val="3570833559"/>
       </p:ext>
     </p:extLst>
   </p:cSld>
@@ -13748,14 +13713,14 @@
           <a:effectLst/>
           <a:extLst>
             <a:ext uri="{909E8E84-426E-40DD-AFC4-6F175D3DCCD1}">
-              <a14:hiddenFill xmlns:a14="http://schemas.microsoft.com/office/drawing/2010/main" xmlns="">
+              <a14:hiddenFill xmlns:a14="http://schemas.microsoft.com/office/drawing/2010/main">
                 <a:solidFill>
                   <a:schemeClr val="accent1"/>
                 </a:solidFill>
               </a14:hiddenFill>
             </a:ext>
             <a:ext uri="{91240B29-F687-4F45-9708-019B960494DF}">
-              <a14:hiddenLine xmlns:a14="http://schemas.microsoft.com/office/drawing/2010/main" xmlns="" w="9525">
+              <a14:hiddenLine xmlns:a14="http://schemas.microsoft.com/office/drawing/2010/main" w="9525">
                 <a:solidFill>
                   <a:schemeClr val="tx1"/>
                 </a:solidFill>
@@ -13765,7 +13730,7 @@
               </a14:hiddenLine>
             </a:ext>
             <a:ext uri="{AF507438-7753-43E0-B8FC-AC1667EBCBE1}">
-              <a14:hiddenEffects xmlns:a14="http://schemas.microsoft.com/office/drawing/2010/main" xmlns="">
+              <a14:hiddenEffects xmlns:a14="http://schemas.microsoft.com/office/drawing/2010/main">
                 <a:effectLst>
                   <a:outerShdw dist="35921" dir="2700000" algn="ctr" rotWithShape="0">
                     <a:schemeClr val="bg2"/>
@@ -13977,7 +13942,7 @@
           <p:nvPr>
             <p:extLst>
               <p:ext uri="{D42A27DB-BD31-4B8C-83A1-F6EECF244321}">
-                <p14:modId xmlns:p14="http://schemas.microsoft.com/office/powerpoint/2010/main" xmlns="" val="2390042067"/>
+                <p14:modId xmlns:p14="http://schemas.microsoft.com/office/powerpoint/2010/main" val="2390042067"/>
               </p:ext>
             </p:extLst>
           </p:nvPr>
@@ -13996,14 +13961,14 @@
                 <a:gridCol w="4895955">
                   <a:extLst>
                     <a:ext uri="{9D8B030D-6E8A-4147-A177-3AD203B41FA5}">
-                      <a16:colId xmlns:a16="http://schemas.microsoft.com/office/drawing/2014/main" xmlns="" val="4014998671"/>
+                      <a16:colId xmlns:a16="http://schemas.microsoft.com/office/drawing/2014/main" val="4014998671"/>
                     </a:ext>
                   </a:extLst>
                 </a:gridCol>
                 <a:gridCol w="6880408">
                   <a:extLst>
                     <a:ext uri="{9D8B030D-6E8A-4147-A177-3AD203B41FA5}">
-                      <a16:colId xmlns:a16="http://schemas.microsoft.com/office/drawing/2014/main" xmlns="" val="2612573693"/>
+                      <a16:colId xmlns:a16="http://schemas.microsoft.com/office/drawing/2014/main" val="2612573693"/>
                     </a:ext>
                   </a:extLst>
                 </a:gridCol>
@@ -14039,7 +14004,7 @@
                 </a:tc>
                 <a:extLst>
                   <a:ext uri="{0D108BD9-81ED-4DB2-BD59-A6C34878D82A}">
-                    <a16:rowId xmlns:a16="http://schemas.microsoft.com/office/drawing/2014/main" xmlns="" val="995508080"/>
+                    <a16:rowId xmlns:a16="http://schemas.microsoft.com/office/drawing/2014/main" val="995508080"/>
                   </a:ext>
                 </a:extLst>
               </a:tr>
@@ -14284,7 +14249,7 @@
                 </a:tc>
                 <a:extLst>
                   <a:ext uri="{0D108BD9-81ED-4DB2-BD59-A6C34878D82A}">
-                    <a16:rowId xmlns:a16="http://schemas.microsoft.com/office/drawing/2014/main" xmlns="" val="1248382124"/>
+                    <a16:rowId xmlns:a16="http://schemas.microsoft.com/office/drawing/2014/main" val="1248382124"/>
                   </a:ext>
                 </a:extLst>
               </a:tr>
@@ -14295,7 +14260,7 @@
     </p:spTree>
     <p:extLst>
       <p:ext uri="{BB962C8B-B14F-4D97-AF65-F5344CB8AC3E}">
-        <p14:creationId xmlns:p14="http://schemas.microsoft.com/office/powerpoint/2010/main" xmlns="" val="167373161"/>
+        <p14:creationId xmlns:p14="http://schemas.microsoft.com/office/powerpoint/2010/main" val="167373161"/>
       </p:ext>
     </p:extLst>
   </p:cSld>
@@ -14385,14 +14350,14 @@
           <a:effectLst/>
           <a:extLst>
             <a:ext uri="{909E8E84-426E-40DD-AFC4-6F175D3DCCD1}">
-              <a14:hiddenFill xmlns:a14="http://schemas.microsoft.com/office/drawing/2010/main" xmlns="">
+              <a14:hiddenFill xmlns:a14="http://schemas.microsoft.com/office/drawing/2010/main">
                 <a:solidFill>
                   <a:schemeClr val="accent1"/>
                 </a:solidFill>
               </a14:hiddenFill>
             </a:ext>
             <a:ext uri="{91240B29-F687-4F45-9708-019B960494DF}">
-              <a14:hiddenLine xmlns:a14="http://schemas.microsoft.com/office/drawing/2010/main" xmlns="" w="9525">
+              <a14:hiddenLine xmlns:a14="http://schemas.microsoft.com/office/drawing/2010/main" w="9525">
                 <a:solidFill>
                   <a:schemeClr val="tx1"/>
                 </a:solidFill>
@@ -14402,7 +14367,7 @@
               </a14:hiddenLine>
             </a:ext>
             <a:ext uri="{AF507438-7753-43E0-B8FC-AC1667EBCBE1}">
-              <a14:hiddenEffects xmlns:a14="http://schemas.microsoft.com/office/drawing/2010/main" xmlns="">
+              <a14:hiddenEffects xmlns:a14="http://schemas.microsoft.com/office/drawing/2010/main">
                 <a:effectLst>
                   <a:outerShdw dist="35921" dir="2700000" algn="ctr" rotWithShape="0">
                     <a:schemeClr val="bg2"/>
@@ -14614,7 +14579,7 @@
           <p:nvPr>
             <p:extLst>
               <p:ext uri="{D42A27DB-BD31-4B8C-83A1-F6EECF244321}">
-                <p14:modId xmlns:p14="http://schemas.microsoft.com/office/powerpoint/2010/main" xmlns="" val="670160064"/>
+                <p14:modId xmlns:p14="http://schemas.microsoft.com/office/powerpoint/2010/main" val="670160064"/>
               </p:ext>
             </p:extLst>
           </p:nvPr>
@@ -14633,14 +14598,14 @@
                 <a:gridCol w="5957455">
                   <a:extLst>
                     <a:ext uri="{9D8B030D-6E8A-4147-A177-3AD203B41FA5}">
-                      <a16:colId xmlns:a16="http://schemas.microsoft.com/office/drawing/2014/main" xmlns="" val="4014998671"/>
+                      <a16:colId xmlns:a16="http://schemas.microsoft.com/office/drawing/2014/main" val="4014998671"/>
                     </a:ext>
                   </a:extLst>
                 </a:gridCol>
                 <a:gridCol w="5957455">
                   <a:extLst>
                     <a:ext uri="{9D8B030D-6E8A-4147-A177-3AD203B41FA5}">
-                      <a16:colId xmlns:a16="http://schemas.microsoft.com/office/drawing/2014/main" xmlns="" val="2612573693"/>
+                      <a16:colId xmlns:a16="http://schemas.microsoft.com/office/drawing/2014/main" val="2612573693"/>
                     </a:ext>
                   </a:extLst>
                 </a:gridCol>
@@ -14684,7 +14649,7 @@
                 </a:tc>
                 <a:extLst>
                   <a:ext uri="{0D108BD9-81ED-4DB2-BD59-A6C34878D82A}">
-                    <a16:rowId xmlns:a16="http://schemas.microsoft.com/office/drawing/2014/main" xmlns="" val="995508080"/>
+                    <a16:rowId xmlns:a16="http://schemas.microsoft.com/office/drawing/2014/main" val="995508080"/>
                   </a:ext>
                 </a:extLst>
               </a:tr>
@@ -14961,7 +14926,7 @@
                 </a:tc>
                 <a:extLst>
                   <a:ext uri="{0D108BD9-81ED-4DB2-BD59-A6C34878D82A}">
-                    <a16:rowId xmlns:a16="http://schemas.microsoft.com/office/drawing/2014/main" xmlns="" val="1248382124"/>
+                    <a16:rowId xmlns:a16="http://schemas.microsoft.com/office/drawing/2014/main" val="1248382124"/>
                   </a:ext>
                 </a:extLst>
               </a:tr>
@@ -14972,7 +14937,7 @@
     </p:spTree>
     <p:extLst>
       <p:ext uri="{BB962C8B-B14F-4D97-AF65-F5344CB8AC3E}">
-        <p14:creationId xmlns:p14="http://schemas.microsoft.com/office/powerpoint/2010/main" xmlns="" val="1130226141"/>
+        <p14:creationId xmlns:p14="http://schemas.microsoft.com/office/powerpoint/2010/main" val="1130226141"/>
       </p:ext>
     </p:extLst>
   </p:cSld>
@@ -15059,14 +15024,14 @@
           <a:effectLst/>
           <a:extLst>
             <a:ext uri="{909E8E84-426E-40DD-AFC4-6F175D3DCCD1}">
-              <a14:hiddenFill xmlns:a14="http://schemas.microsoft.com/office/drawing/2010/main" xmlns="">
+              <a14:hiddenFill xmlns:a14="http://schemas.microsoft.com/office/drawing/2010/main">
                 <a:solidFill>
                   <a:schemeClr val="accent1"/>
                 </a:solidFill>
               </a14:hiddenFill>
             </a:ext>
             <a:ext uri="{91240B29-F687-4F45-9708-019B960494DF}">
-              <a14:hiddenLine xmlns:a14="http://schemas.microsoft.com/office/drawing/2010/main" xmlns="" w="9525">
+              <a14:hiddenLine xmlns:a14="http://schemas.microsoft.com/office/drawing/2010/main" w="9525">
                 <a:solidFill>
                   <a:schemeClr val="tx1"/>
                 </a:solidFill>
@@ -15076,7 +15041,7 @@
               </a14:hiddenLine>
             </a:ext>
             <a:ext uri="{AF507438-7753-43E0-B8FC-AC1667EBCBE1}">
-              <a14:hiddenEffects xmlns:a14="http://schemas.microsoft.com/office/drawing/2010/main" xmlns="">
+              <a14:hiddenEffects xmlns:a14="http://schemas.microsoft.com/office/drawing/2010/main">
                 <a:effectLst>
                   <a:outerShdw dist="35921" dir="2700000" algn="ctr" rotWithShape="0">
                     <a:schemeClr val="bg2"/>
@@ -15429,7 +15394,7 @@
     </p:spTree>
     <p:extLst>
       <p:ext uri="{BB962C8B-B14F-4D97-AF65-F5344CB8AC3E}">
-        <p14:creationId xmlns:p14="http://schemas.microsoft.com/office/powerpoint/2010/main" xmlns="" val="395570088"/>
+        <p14:creationId xmlns:p14="http://schemas.microsoft.com/office/powerpoint/2010/main" val="395570088"/>
       </p:ext>
     </p:extLst>
   </p:cSld>
@@ -15515,14 +15480,14 @@
           <a:effectLst/>
           <a:extLst>
             <a:ext uri="{909E8E84-426E-40DD-AFC4-6F175D3DCCD1}">
-              <a14:hiddenFill xmlns:a14="http://schemas.microsoft.com/office/drawing/2010/main" xmlns="">
+              <a14:hiddenFill xmlns:a14="http://schemas.microsoft.com/office/drawing/2010/main">
                 <a:solidFill>
                   <a:schemeClr val="accent1"/>
                 </a:solidFill>
               </a14:hiddenFill>
             </a:ext>
             <a:ext uri="{91240B29-F687-4F45-9708-019B960494DF}">
-              <a14:hiddenLine xmlns:a14="http://schemas.microsoft.com/office/drawing/2010/main" xmlns="" w="9525">
+              <a14:hiddenLine xmlns:a14="http://schemas.microsoft.com/office/drawing/2010/main" w="9525">
                 <a:solidFill>
                   <a:schemeClr val="tx1"/>
                 </a:solidFill>
@@ -15532,7 +15497,7 @@
               </a14:hiddenLine>
             </a:ext>
             <a:ext uri="{AF507438-7753-43E0-B8FC-AC1667EBCBE1}">
-              <a14:hiddenEffects xmlns:a14="http://schemas.microsoft.com/office/drawing/2010/main" xmlns="">
+              <a14:hiddenEffects xmlns:a14="http://schemas.microsoft.com/office/drawing/2010/main">
                 <a:effectLst>
                   <a:outerShdw dist="35921" dir="2700000" algn="ctr" rotWithShape="0">
                     <a:schemeClr val="bg2"/>
@@ -15720,7 +15685,7 @@
           <p:nvPr>
             <p:extLst>
               <p:ext uri="{D42A27DB-BD31-4B8C-83A1-F6EECF244321}">
-                <p14:modId xmlns:p14="http://schemas.microsoft.com/office/powerpoint/2010/main" xmlns="" val="2796877267"/>
+                <p14:modId xmlns:p14="http://schemas.microsoft.com/office/powerpoint/2010/main" val="2796877267"/>
               </p:ext>
             </p:extLst>
           </p:nvPr>
@@ -15739,21 +15704,21 @@
                 <a:gridCol w="4308805">
                   <a:extLst>
                     <a:ext uri="{9D8B030D-6E8A-4147-A177-3AD203B41FA5}">
-                      <a16:colId xmlns:a16="http://schemas.microsoft.com/office/drawing/2014/main" xmlns="" val="336949237"/>
+                      <a16:colId xmlns:a16="http://schemas.microsoft.com/office/drawing/2014/main" val="336949237"/>
                     </a:ext>
                   </a:extLst>
                 </a:gridCol>
                 <a:gridCol w="3527940">
                   <a:extLst>
                     <a:ext uri="{9D8B030D-6E8A-4147-A177-3AD203B41FA5}">
-                      <a16:colId xmlns:a16="http://schemas.microsoft.com/office/drawing/2014/main" xmlns="" val="2248038048"/>
+                      <a16:colId xmlns:a16="http://schemas.microsoft.com/office/drawing/2014/main" val="2248038048"/>
                     </a:ext>
                   </a:extLst>
                 </a:gridCol>
                 <a:gridCol w="3527940">
                   <a:extLst>
                     <a:ext uri="{9D8B030D-6E8A-4147-A177-3AD203B41FA5}">
-                      <a16:colId xmlns:a16="http://schemas.microsoft.com/office/drawing/2014/main" xmlns="" val="890414427"/>
+                      <a16:colId xmlns:a16="http://schemas.microsoft.com/office/drawing/2014/main" val="890414427"/>
                     </a:ext>
                   </a:extLst>
                 </a:gridCol>
@@ -15819,7 +15784,7 @@
                 </a:tc>
                 <a:extLst>
                   <a:ext uri="{0D108BD9-81ED-4DB2-BD59-A6C34878D82A}">
-                    <a16:rowId xmlns:a16="http://schemas.microsoft.com/office/drawing/2014/main" xmlns="" val="2034966949"/>
+                    <a16:rowId xmlns:a16="http://schemas.microsoft.com/office/drawing/2014/main" val="2034966949"/>
                   </a:ext>
                 </a:extLst>
               </a:tr>
@@ -16120,7 +16085,7 @@
                 </a:tc>
                 <a:extLst>
                   <a:ext uri="{0D108BD9-81ED-4DB2-BD59-A6C34878D82A}">
-                    <a16:rowId xmlns:a16="http://schemas.microsoft.com/office/drawing/2014/main" xmlns="" val="1156170327"/>
+                    <a16:rowId xmlns:a16="http://schemas.microsoft.com/office/drawing/2014/main" val="1156170327"/>
                   </a:ext>
                 </a:extLst>
               </a:tr>
@@ -16131,7 +16096,7 @@
     </p:spTree>
     <p:extLst>
       <p:ext uri="{BB962C8B-B14F-4D97-AF65-F5344CB8AC3E}">
-        <p14:creationId xmlns:p14="http://schemas.microsoft.com/office/powerpoint/2010/main" xmlns="" val="2266622382"/>
+        <p14:creationId xmlns:p14="http://schemas.microsoft.com/office/powerpoint/2010/main" val="2266622382"/>
       </p:ext>
     </p:extLst>
   </p:cSld>
@@ -16204,7 +16169,7 @@
           <p:nvPr>
             <p:extLst>
               <p:ext uri="{D42A27DB-BD31-4B8C-83A1-F6EECF244321}">
-                <p14:modId xmlns:p14="http://schemas.microsoft.com/office/powerpoint/2010/main" xmlns="" val="2643280494"/>
+                <p14:modId xmlns:p14="http://schemas.microsoft.com/office/powerpoint/2010/main" val="2643280494"/>
               </p:ext>
             </p:extLst>
           </p:nvPr>
@@ -16223,14 +16188,14 @@
                 <a:gridCol w="6112042">
                   <a:extLst>
                     <a:ext uri="{9D8B030D-6E8A-4147-A177-3AD203B41FA5}">
-                      <a16:colId xmlns:a16="http://schemas.microsoft.com/office/drawing/2014/main" xmlns="" val="336949237"/>
+                      <a16:colId xmlns:a16="http://schemas.microsoft.com/office/drawing/2014/main" val="336949237"/>
                     </a:ext>
                   </a:extLst>
                 </a:gridCol>
                 <a:gridCol w="5534525">
                   <a:extLst>
                     <a:ext uri="{9D8B030D-6E8A-4147-A177-3AD203B41FA5}">
-                      <a16:colId xmlns:a16="http://schemas.microsoft.com/office/drawing/2014/main" xmlns="" val="2248038048"/>
+                      <a16:colId xmlns:a16="http://schemas.microsoft.com/office/drawing/2014/main" val="2248038048"/>
                     </a:ext>
                   </a:extLst>
                 </a:gridCol>
@@ -16274,7 +16239,7 @@
                 </a:tc>
                 <a:extLst>
                   <a:ext uri="{0D108BD9-81ED-4DB2-BD59-A6C34878D82A}">
-                    <a16:rowId xmlns:a16="http://schemas.microsoft.com/office/drawing/2014/main" xmlns="" val="2034966949"/>
+                    <a16:rowId xmlns:a16="http://schemas.microsoft.com/office/drawing/2014/main" val="2034966949"/>
                   </a:ext>
                 </a:extLst>
               </a:tr>
@@ -16840,7 +16805,7 @@
                 </a:tc>
                 <a:extLst>
                   <a:ext uri="{0D108BD9-81ED-4DB2-BD59-A6C34878D82A}">
-                    <a16:rowId xmlns:a16="http://schemas.microsoft.com/office/drawing/2014/main" xmlns="" val="1156170327"/>
+                    <a16:rowId xmlns:a16="http://schemas.microsoft.com/office/drawing/2014/main" val="1156170327"/>
                   </a:ext>
                 </a:extLst>
               </a:tr>
@@ -16875,7 +16840,7 @@
     </p:spTree>
     <p:extLst>
       <p:ext uri="{BB962C8B-B14F-4D97-AF65-F5344CB8AC3E}">
-        <p14:creationId xmlns:p14="http://schemas.microsoft.com/office/powerpoint/2010/main" xmlns="" val="1275654679"/>
+        <p14:creationId xmlns:p14="http://schemas.microsoft.com/office/powerpoint/2010/main" val="1275654679"/>
       </p:ext>
     </p:extLst>
   </p:cSld>
@@ -16935,7 +16900,7 @@
     </a:clrScheme>
     <a:fontScheme name="Facet">
       <a:majorFont>
-        <a:latin typeface="Trebuchet MS"/>
+        <a:latin typeface="Trebuchet MS" panose="020B0603020202020204"/>
         <a:ea typeface=""/>
         <a:cs typeface=""/>
         <a:font script="Jpan" typeface="メイリオ"/>
@@ -16970,7 +16935,7 @@
         <a:font script="Geor" typeface="Sylfaen"/>
       </a:majorFont>
       <a:minorFont>
-        <a:latin typeface="Trebuchet MS"/>
+        <a:latin typeface="Trebuchet MS" panose="020B0603020202020204"/>
         <a:ea typeface=""/>
         <a:cs typeface=""/>
         <a:font script="Jpan" typeface="メイリオ"/>
@@ -17143,7 +17108,7 @@
   <a:extraClrSchemeLst/>
   <a:extLst>
     <a:ext uri="{05A4C25C-085E-4340-85A3-A5531E510DB2}">
-      <thm15:themeFamily xmlns:thm15="http://schemas.microsoft.com/office/thememl/2012/main" xmlns="" name="Facet" id="{C0C680CD-088A-49FC-A102-D699147F32B2}" vid="{CFBC31BA-B70F-4F30-BCAA-4F3011E16C4D}"/>
+      <thm15:themeFamily xmlns:thm15="http://schemas.microsoft.com/office/thememl/2012/main" name="Facet" id="{C0C680CD-088A-49FC-A102-D699147F32B2}" vid="{CFBC31BA-B70F-4F30-BCAA-4F3011E16C4D}"/>
     </a:ext>
   </a:extLst>
 </a:theme>

</xml_diff>